<commit_message>
add the example of proxy pattern
</commit_message>
<xml_diff>
--- a/Student Homework/Homework-20151205.pptx
+++ b/Student Homework/Homework-20151205.pptx
@@ -220,7 +220,7 @@
           <a:p>
             <a:fld id="{0A1B97A5-D930-4925-A811-FB9A61794850}" type="datetimeFigureOut">
               <a:rPr lang="zh-TW" altLang="en-US" smtClean="0"/>
-              <a:t>2015/12/5</a:t>
+              <a:t>2015/12/6</a:t>
             </a:fld>
             <a:endParaRPr lang="zh-TW" altLang="en-US"/>
           </a:p>
@@ -795,7 +795,7 @@
           <a:p>
             <a:fld id="{22C6B309-C7D6-4CEB-94B8-B35E744E2BB3}" type="datetimeFigureOut">
               <a:rPr lang="zh-TW" altLang="en-US" smtClean="0"/>
-              <a:t>2015/12/5</a:t>
+              <a:t>2015/12/6</a:t>
             </a:fld>
             <a:endParaRPr lang="zh-TW" altLang="en-US"/>
           </a:p>
@@ -965,7 +965,7 @@
           <a:p>
             <a:fld id="{22C6B309-C7D6-4CEB-94B8-B35E744E2BB3}" type="datetimeFigureOut">
               <a:rPr lang="zh-TW" altLang="en-US" smtClean="0"/>
-              <a:t>2015/12/5</a:t>
+              <a:t>2015/12/6</a:t>
             </a:fld>
             <a:endParaRPr lang="zh-TW" altLang="en-US"/>
           </a:p>
@@ -1145,7 +1145,7 @@
           <a:p>
             <a:fld id="{22C6B309-C7D6-4CEB-94B8-B35E744E2BB3}" type="datetimeFigureOut">
               <a:rPr lang="zh-TW" altLang="en-US" smtClean="0"/>
-              <a:t>2015/12/5</a:t>
+              <a:t>2015/12/6</a:t>
             </a:fld>
             <a:endParaRPr lang="zh-TW" altLang="en-US"/>
           </a:p>
@@ -1315,7 +1315,7 @@
           <a:p>
             <a:fld id="{22C6B309-C7D6-4CEB-94B8-B35E744E2BB3}" type="datetimeFigureOut">
               <a:rPr lang="zh-TW" altLang="en-US" smtClean="0"/>
-              <a:t>2015/12/5</a:t>
+              <a:t>2015/12/6</a:t>
             </a:fld>
             <a:endParaRPr lang="zh-TW" altLang="en-US"/>
           </a:p>
@@ -1561,7 +1561,7 @@
           <a:p>
             <a:fld id="{22C6B309-C7D6-4CEB-94B8-B35E744E2BB3}" type="datetimeFigureOut">
               <a:rPr lang="zh-TW" altLang="en-US" smtClean="0"/>
-              <a:t>2015/12/5</a:t>
+              <a:t>2015/12/6</a:t>
             </a:fld>
             <a:endParaRPr lang="zh-TW" altLang="en-US"/>
           </a:p>
@@ -1793,7 +1793,7 @@
           <a:p>
             <a:fld id="{22C6B309-C7D6-4CEB-94B8-B35E744E2BB3}" type="datetimeFigureOut">
               <a:rPr lang="zh-TW" altLang="en-US" smtClean="0"/>
-              <a:t>2015/12/5</a:t>
+              <a:t>2015/12/6</a:t>
             </a:fld>
             <a:endParaRPr lang="zh-TW" altLang="en-US"/>
           </a:p>
@@ -2160,7 +2160,7 @@
           <a:p>
             <a:fld id="{22C6B309-C7D6-4CEB-94B8-B35E744E2BB3}" type="datetimeFigureOut">
               <a:rPr lang="zh-TW" altLang="en-US" smtClean="0"/>
-              <a:t>2015/12/5</a:t>
+              <a:t>2015/12/6</a:t>
             </a:fld>
             <a:endParaRPr lang="zh-TW" altLang="en-US"/>
           </a:p>
@@ -2278,7 +2278,7 @@
           <a:p>
             <a:fld id="{22C6B309-C7D6-4CEB-94B8-B35E744E2BB3}" type="datetimeFigureOut">
               <a:rPr lang="zh-TW" altLang="en-US" smtClean="0"/>
-              <a:t>2015/12/5</a:t>
+              <a:t>2015/12/6</a:t>
             </a:fld>
             <a:endParaRPr lang="zh-TW" altLang="en-US"/>
           </a:p>
@@ -2373,7 +2373,7 @@
           <a:p>
             <a:fld id="{22C6B309-C7D6-4CEB-94B8-B35E744E2BB3}" type="datetimeFigureOut">
               <a:rPr lang="zh-TW" altLang="en-US" smtClean="0"/>
-              <a:t>2015/12/5</a:t>
+              <a:t>2015/12/6</a:t>
             </a:fld>
             <a:endParaRPr lang="zh-TW" altLang="en-US"/>
           </a:p>
@@ -2650,7 +2650,7 @@
           <a:p>
             <a:fld id="{22C6B309-C7D6-4CEB-94B8-B35E744E2BB3}" type="datetimeFigureOut">
               <a:rPr lang="zh-TW" altLang="en-US" smtClean="0"/>
-              <a:t>2015/12/5</a:t>
+              <a:t>2015/12/6</a:t>
             </a:fld>
             <a:endParaRPr lang="zh-TW" altLang="en-US"/>
           </a:p>
@@ -2903,7 +2903,7 @@
           <a:p>
             <a:fld id="{22C6B309-C7D6-4CEB-94B8-B35E744E2BB3}" type="datetimeFigureOut">
               <a:rPr lang="zh-TW" altLang="en-US" smtClean="0"/>
-              <a:t>2015/12/5</a:t>
+              <a:t>2015/12/6</a:t>
             </a:fld>
             <a:endParaRPr lang="zh-TW" altLang="en-US"/>
           </a:p>
@@ -3116,7 +3116,7 @@
           <a:p>
             <a:fld id="{22C6B309-C7D6-4CEB-94B8-B35E744E2BB3}" type="datetimeFigureOut">
               <a:rPr lang="zh-TW" altLang="en-US" smtClean="0"/>
-              <a:t>2015/12/5</a:t>
+              <a:t>2015/12/6</a:t>
             </a:fld>
             <a:endParaRPr lang="zh-TW" altLang="en-US"/>
           </a:p>
@@ -3606,15 +3606,7 @@
                 <a:ea typeface="Batang" panose="02030600000101010101" pitchFamily="18" charset="-127"/>
                 <a:cs typeface="Arial Unicode MS" panose="020B0604020202020204" pitchFamily="34" charset="-120"/>
               </a:rPr>
-              <a:t>Home</a:t>
-            </a:r>
-            <a:r>
-              <a:rPr lang="en-US" altLang="zh-TW" sz="4800" b="1" dirty="0" smtClean="0">
-                <a:latin typeface="Batang" panose="02030600000101010101" pitchFamily="18" charset="-127"/>
-                <a:ea typeface="Batang" panose="02030600000101010101" pitchFamily="18" charset="-127"/>
-                <a:cs typeface="Arial Unicode MS" panose="020B0604020202020204" pitchFamily="34" charset="-120"/>
-              </a:rPr>
-              <a:t>work</a:t>
+              <a:t>Homework</a:t>
             </a:r>
             <a:r>
               <a:rPr lang="zh-TW" altLang="en-US" sz="4800" b="1" dirty="0" smtClean="0">
@@ -3786,18 +3778,39 @@
               <a:t>假設你是開發</a:t>
             </a:r>
             <a:r>
+              <a:rPr lang="en-US" altLang="zh-TW" sz="3200" strike="sngStrike" dirty="0" smtClean="0">
+                <a:latin typeface="微軟正黑體" panose="020B0604030504040204" pitchFamily="34" charset="-120"/>
+                <a:ea typeface="微軟正黑體" panose="020B0604030504040204" pitchFamily="34" charset="-120"/>
+              </a:rPr>
+              <a:t>Expedia</a:t>
+            </a:r>
+            <a:r>
               <a:rPr lang="en-US" altLang="zh-TW" sz="3200" dirty="0" smtClean="0">
                 <a:latin typeface="微軟正黑體" panose="020B0604030504040204" pitchFamily="34" charset="-120"/>
                 <a:ea typeface="微軟正黑體" panose="020B0604030504040204" pitchFamily="34" charset="-120"/>
               </a:rPr>
-              <a:t>Expedia</a:t>
+              <a:t> Hotel </a:t>
+            </a:r>
+            <a:r>
+              <a:rPr lang="en-US" altLang="zh-TW" sz="3200" dirty="0" err="1" smtClean="0">
+                <a:latin typeface="微軟正黑體" panose="020B0604030504040204" pitchFamily="34" charset="-120"/>
+                <a:ea typeface="微軟正黑體" panose="020B0604030504040204" pitchFamily="34" charset="-120"/>
+              </a:rPr>
+              <a:t>Comebuy</a:t>
             </a:r>
             <a:r>
               <a:rPr lang="zh-TW" altLang="en-US" sz="3200" dirty="0" smtClean="0">
                 <a:latin typeface="微軟正黑體" panose="020B0604030504040204" pitchFamily="34" charset="-120"/>
                 <a:ea typeface="微軟正黑體" panose="020B0604030504040204" pitchFamily="34" charset="-120"/>
               </a:rPr>
-              <a:t>的廠商，要能夠取得所有的飯店相關的訂房資訊，並且將其呈現於畫面上，請問要使用何種</a:t>
+              <a:t>的</a:t>
+            </a:r>
+            <a:r>
+              <a:rPr lang="zh-TW" altLang="en-US" sz="3200" dirty="0" smtClean="0">
+                <a:latin typeface="微軟正黑體" panose="020B0604030504040204" pitchFamily="34" charset="-120"/>
+                <a:ea typeface="微軟正黑體" panose="020B0604030504040204" pitchFamily="34" charset="-120"/>
+              </a:rPr>
+              <a:t>廠商，要能夠取得所有的飯店相關的訂房資訊，並且將其呈現於畫面上，請問要使用何種</a:t>
             </a:r>
             <a:r>
               <a:rPr lang="en-US" altLang="zh-TW" sz="3200" dirty="0" smtClean="0">
@@ -3992,15 +4005,7 @@
                 <a:ea typeface="Batang" panose="02030600000101010101" pitchFamily="18" charset="-127"/>
                 <a:cs typeface="Arial Unicode MS" panose="020B0604020202020204" pitchFamily="34" charset="-120"/>
               </a:rPr>
-              <a:t>Home</a:t>
-            </a:r>
-            <a:r>
-              <a:rPr lang="en-US" altLang="zh-TW" sz="4800" b="1" dirty="0" smtClean="0">
-                <a:latin typeface="Batang" panose="02030600000101010101" pitchFamily="18" charset="-127"/>
-                <a:ea typeface="Batang" panose="02030600000101010101" pitchFamily="18" charset="-127"/>
-                <a:cs typeface="Arial Unicode MS" panose="020B0604020202020204" pitchFamily="34" charset="-120"/>
-              </a:rPr>
-              <a:t>work</a:t>
+              <a:t>Homework</a:t>
             </a:r>
             <a:r>
               <a:rPr lang="zh-TW" altLang="en-US" sz="4800" b="1" dirty="0" smtClean="0">

</xml_diff>

<commit_message>
Revert "homework3 by bill"
</commit_message>
<xml_diff>
--- a/Student Homework/Homework-20151205.pptx
+++ b/Student Homework/Homework-20151205.pptx
@@ -220,7 +220,7 @@
           <a:p>
             <a:fld id="{0A1B97A5-D930-4925-A811-FB9A61794850}" type="datetimeFigureOut">
               <a:rPr lang="zh-TW" altLang="en-US" smtClean="0"/>
-              <a:t>2015/12/6</a:t>
+              <a:t>2015/12/5</a:t>
             </a:fld>
             <a:endParaRPr lang="zh-TW" altLang="en-US"/>
           </a:p>
@@ -795,7 +795,7 @@
           <a:p>
             <a:fld id="{22C6B309-C7D6-4CEB-94B8-B35E744E2BB3}" type="datetimeFigureOut">
               <a:rPr lang="zh-TW" altLang="en-US" smtClean="0"/>
-              <a:t>2015/12/6</a:t>
+              <a:t>2015/12/5</a:t>
             </a:fld>
             <a:endParaRPr lang="zh-TW" altLang="en-US"/>
           </a:p>
@@ -965,7 +965,7 @@
           <a:p>
             <a:fld id="{22C6B309-C7D6-4CEB-94B8-B35E744E2BB3}" type="datetimeFigureOut">
               <a:rPr lang="zh-TW" altLang="en-US" smtClean="0"/>
-              <a:t>2015/12/6</a:t>
+              <a:t>2015/12/5</a:t>
             </a:fld>
             <a:endParaRPr lang="zh-TW" altLang="en-US"/>
           </a:p>
@@ -1145,7 +1145,7 @@
           <a:p>
             <a:fld id="{22C6B309-C7D6-4CEB-94B8-B35E744E2BB3}" type="datetimeFigureOut">
               <a:rPr lang="zh-TW" altLang="en-US" smtClean="0"/>
-              <a:t>2015/12/6</a:t>
+              <a:t>2015/12/5</a:t>
             </a:fld>
             <a:endParaRPr lang="zh-TW" altLang="en-US"/>
           </a:p>
@@ -1315,7 +1315,7 @@
           <a:p>
             <a:fld id="{22C6B309-C7D6-4CEB-94B8-B35E744E2BB3}" type="datetimeFigureOut">
               <a:rPr lang="zh-TW" altLang="en-US" smtClean="0"/>
-              <a:t>2015/12/6</a:t>
+              <a:t>2015/12/5</a:t>
             </a:fld>
             <a:endParaRPr lang="zh-TW" altLang="en-US"/>
           </a:p>
@@ -1561,7 +1561,7 @@
           <a:p>
             <a:fld id="{22C6B309-C7D6-4CEB-94B8-B35E744E2BB3}" type="datetimeFigureOut">
               <a:rPr lang="zh-TW" altLang="en-US" smtClean="0"/>
-              <a:t>2015/12/6</a:t>
+              <a:t>2015/12/5</a:t>
             </a:fld>
             <a:endParaRPr lang="zh-TW" altLang="en-US"/>
           </a:p>
@@ -1793,7 +1793,7 @@
           <a:p>
             <a:fld id="{22C6B309-C7D6-4CEB-94B8-B35E744E2BB3}" type="datetimeFigureOut">
               <a:rPr lang="zh-TW" altLang="en-US" smtClean="0"/>
-              <a:t>2015/12/6</a:t>
+              <a:t>2015/12/5</a:t>
             </a:fld>
             <a:endParaRPr lang="zh-TW" altLang="en-US"/>
           </a:p>
@@ -2160,7 +2160,7 @@
           <a:p>
             <a:fld id="{22C6B309-C7D6-4CEB-94B8-B35E744E2BB3}" type="datetimeFigureOut">
               <a:rPr lang="zh-TW" altLang="en-US" smtClean="0"/>
-              <a:t>2015/12/6</a:t>
+              <a:t>2015/12/5</a:t>
             </a:fld>
             <a:endParaRPr lang="zh-TW" altLang="en-US"/>
           </a:p>
@@ -2278,7 +2278,7 @@
           <a:p>
             <a:fld id="{22C6B309-C7D6-4CEB-94B8-B35E744E2BB3}" type="datetimeFigureOut">
               <a:rPr lang="zh-TW" altLang="en-US" smtClean="0"/>
-              <a:t>2015/12/6</a:t>
+              <a:t>2015/12/5</a:t>
             </a:fld>
             <a:endParaRPr lang="zh-TW" altLang="en-US"/>
           </a:p>
@@ -2373,7 +2373,7 @@
           <a:p>
             <a:fld id="{22C6B309-C7D6-4CEB-94B8-B35E744E2BB3}" type="datetimeFigureOut">
               <a:rPr lang="zh-TW" altLang="en-US" smtClean="0"/>
-              <a:t>2015/12/6</a:t>
+              <a:t>2015/12/5</a:t>
             </a:fld>
             <a:endParaRPr lang="zh-TW" altLang="en-US"/>
           </a:p>
@@ -2650,7 +2650,7 @@
           <a:p>
             <a:fld id="{22C6B309-C7D6-4CEB-94B8-B35E744E2BB3}" type="datetimeFigureOut">
               <a:rPr lang="zh-TW" altLang="en-US" smtClean="0"/>
-              <a:t>2015/12/6</a:t>
+              <a:t>2015/12/5</a:t>
             </a:fld>
             <a:endParaRPr lang="zh-TW" altLang="en-US"/>
           </a:p>
@@ -2903,7 +2903,7 @@
           <a:p>
             <a:fld id="{22C6B309-C7D6-4CEB-94B8-B35E744E2BB3}" type="datetimeFigureOut">
               <a:rPr lang="zh-TW" altLang="en-US" smtClean="0"/>
-              <a:t>2015/12/6</a:t>
+              <a:t>2015/12/5</a:t>
             </a:fld>
             <a:endParaRPr lang="zh-TW" altLang="en-US"/>
           </a:p>
@@ -3116,7 +3116,7 @@
           <a:p>
             <a:fld id="{22C6B309-C7D6-4CEB-94B8-B35E744E2BB3}" type="datetimeFigureOut">
               <a:rPr lang="zh-TW" altLang="en-US" smtClean="0"/>
-              <a:t>2015/12/6</a:t>
+              <a:t>2015/12/5</a:t>
             </a:fld>
             <a:endParaRPr lang="zh-TW" altLang="en-US"/>
           </a:p>
@@ -3606,7 +3606,15 @@
                 <a:ea typeface="Batang" panose="02030600000101010101" pitchFamily="18" charset="-127"/>
                 <a:cs typeface="Arial Unicode MS" panose="020B0604020202020204" pitchFamily="34" charset="-120"/>
               </a:rPr>
-              <a:t>Homework</a:t>
+              <a:t>Home</a:t>
+            </a:r>
+            <a:r>
+              <a:rPr lang="en-US" altLang="zh-TW" sz="4800" b="1" dirty="0" smtClean="0">
+                <a:latin typeface="Batang" panose="02030600000101010101" pitchFamily="18" charset="-127"/>
+                <a:ea typeface="Batang" panose="02030600000101010101" pitchFamily="18" charset="-127"/>
+                <a:cs typeface="Arial Unicode MS" panose="020B0604020202020204" pitchFamily="34" charset="-120"/>
+              </a:rPr>
+              <a:t>work</a:t>
             </a:r>
             <a:r>
               <a:rPr lang="zh-TW" altLang="en-US" sz="4800" b="1" dirty="0" smtClean="0">
@@ -3778,39 +3786,18 @@
               <a:t>假設你是開發</a:t>
             </a:r>
             <a:r>
-              <a:rPr lang="en-US" altLang="zh-TW" sz="3200" strike="sngStrike" dirty="0" smtClean="0">
-                <a:latin typeface="微軟正黑體" panose="020B0604030504040204" pitchFamily="34" charset="-120"/>
-                <a:ea typeface="微軟正黑體" panose="020B0604030504040204" pitchFamily="34" charset="-120"/>
-              </a:rPr>
-              <a:t>Expedia</a:t>
-            </a:r>
-            <a:r>
               <a:rPr lang="en-US" altLang="zh-TW" sz="3200" dirty="0" smtClean="0">
                 <a:latin typeface="微軟正黑體" panose="020B0604030504040204" pitchFamily="34" charset="-120"/>
                 <a:ea typeface="微軟正黑體" panose="020B0604030504040204" pitchFamily="34" charset="-120"/>
               </a:rPr>
-              <a:t> Hotel </a:t>
-            </a:r>
-            <a:r>
-              <a:rPr lang="en-US" altLang="zh-TW" sz="3200" dirty="0" err="1" smtClean="0">
-                <a:latin typeface="微軟正黑體" panose="020B0604030504040204" pitchFamily="34" charset="-120"/>
-                <a:ea typeface="微軟正黑體" panose="020B0604030504040204" pitchFamily="34" charset="-120"/>
-              </a:rPr>
-              <a:t>Comebuy</a:t>
+              <a:t>Expedia</a:t>
             </a:r>
             <a:r>
               <a:rPr lang="zh-TW" altLang="en-US" sz="3200" dirty="0" smtClean="0">
                 <a:latin typeface="微軟正黑體" panose="020B0604030504040204" pitchFamily="34" charset="-120"/>
                 <a:ea typeface="微軟正黑體" panose="020B0604030504040204" pitchFamily="34" charset="-120"/>
               </a:rPr>
-              <a:t>的</a:t>
-            </a:r>
-            <a:r>
-              <a:rPr lang="zh-TW" altLang="en-US" sz="3200" dirty="0" smtClean="0">
-                <a:latin typeface="微軟正黑體" panose="020B0604030504040204" pitchFamily="34" charset="-120"/>
-                <a:ea typeface="微軟正黑體" panose="020B0604030504040204" pitchFamily="34" charset="-120"/>
-              </a:rPr>
-              <a:t>廠商，要能夠取得所有的飯店相關的訂房資訊，並且將其呈現於畫面上，請問要使用何種</a:t>
+              <a:t>的廠商，要能夠取得所有的飯店相關的訂房資訊，並且將其呈現於畫面上，請問要使用何種</a:t>
             </a:r>
             <a:r>
               <a:rPr lang="en-US" altLang="zh-TW" sz="3200" dirty="0" smtClean="0">
@@ -4005,7 +3992,15 @@
                 <a:ea typeface="Batang" panose="02030600000101010101" pitchFamily="18" charset="-127"/>
                 <a:cs typeface="Arial Unicode MS" panose="020B0604020202020204" pitchFamily="34" charset="-120"/>
               </a:rPr>
-              <a:t>Homework</a:t>
+              <a:t>Home</a:t>
+            </a:r>
+            <a:r>
+              <a:rPr lang="en-US" altLang="zh-TW" sz="4800" b="1" dirty="0" smtClean="0">
+                <a:latin typeface="Batang" panose="02030600000101010101" pitchFamily="18" charset="-127"/>
+                <a:ea typeface="Batang" panose="02030600000101010101" pitchFamily="18" charset="-127"/>
+                <a:cs typeface="Arial Unicode MS" panose="020B0604020202020204" pitchFamily="34" charset="-120"/>
+              </a:rPr>
+              <a:t>work</a:t>
             </a:r>
             <a:r>
               <a:rPr lang="zh-TW" altLang="en-US" sz="4800" b="1" dirty="0" smtClean="0">

</xml_diff>